<commit_message>
add events to slides
</commit_message>
<xml_diff>
--- a/document-object-model-presentation/Document Object Model.pptx
+++ b/document-object-model-presentation/Document Object Model.pptx
@@ -42,6 +42,12 @@
     <p:sldId id="291" r:id="rId36"/>
     <p:sldId id="292" r:id="rId37"/>
     <p:sldId id="293" r:id="rId38"/>
+    <p:sldId id="294" r:id="rId39"/>
+    <p:sldId id="295" r:id="rId40"/>
+    <p:sldId id="296" r:id="rId41"/>
+    <p:sldId id="297" r:id="rId42"/>
+    <p:sldId id="298" r:id="rId43"/>
+    <p:sldId id="299" r:id="rId44"/>
   </p:sldIdLst>
   <p:sldSz cx="12192000" cy="6858000"/>
   <p:notesSz cx="6858000" cy="9144000"/>
@@ -186,6 +192,12 @@
             <p14:sldId id="291"/>
             <p14:sldId id="292"/>
             <p14:sldId id="293"/>
+            <p14:sldId id="294"/>
+            <p14:sldId id="295"/>
+            <p14:sldId id="296"/>
+            <p14:sldId id="297"/>
+            <p14:sldId id="298"/>
+            <p14:sldId id="299"/>
           </p14:sldIdLst>
         </p14:section>
       </p14:sectionLst>
@@ -383,7 +395,7 @@
           <a:p>
             <a:fld id="{3212B134-D57A-47B0-9FC8-42672359FFDA}" type="datetimeFigureOut">
               <a:rPr lang="en-US" smtClean="0"/>
-              <a:t>4/5/22</a:t>
+              <a:t>4/21/2022</a:t>
             </a:fld>
             <a:endParaRPr lang="en-US"/>
           </a:p>
@@ -658,7 +670,7 @@
           <a:p>
             <a:fld id="{3212B134-D57A-47B0-9FC8-42672359FFDA}" type="datetimeFigureOut">
               <a:rPr lang="en-US" smtClean="0"/>
-              <a:t>4/5/22</a:t>
+              <a:t>4/21/2022</a:t>
             </a:fld>
             <a:endParaRPr lang="en-US"/>
           </a:p>
@@ -852,7 +864,7 @@
           <a:p>
             <a:fld id="{3212B134-D57A-47B0-9FC8-42672359FFDA}" type="datetimeFigureOut">
               <a:rPr lang="en-US" smtClean="0"/>
-              <a:t>4/5/22</a:t>
+              <a:t>4/21/2022</a:t>
             </a:fld>
             <a:endParaRPr lang="en-US"/>
           </a:p>
@@ -1125,7 +1137,7 @@
           <a:p>
             <a:fld id="{3212B134-D57A-47B0-9FC8-42672359FFDA}" type="datetimeFigureOut">
               <a:rPr lang="en-US" smtClean="0"/>
-              <a:t>4/5/22</a:t>
+              <a:t>4/21/2022</a:t>
             </a:fld>
             <a:endParaRPr lang="en-US"/>
           </a:p>
@@ -1466,7 +1478,7 @@
           <a:p>
             <a:fld id="{3212B134-D57A-47B0-9FC8-42672359FFDA}" type="datetimeFigureOut">
               <a:rPr lang="en-US" smtClean="0"/>
-              <a:t>4/5/22</a:t>
+              <a:t>4/21/2022</a:t>
             </a:fld>
             <a:endParaRPr lang="en-US"/>
           </a:p>
@@ -2089,7 +2101,7 @@
           <a:p>
             <a:fld id="{3212B134-D57A-47B0-9FC8-42672359FFDA}" type="datetimeFigureOut">
               <a:rPr lang="en-US" smtClean="0"/>
-              <a:t>4/5/22</a:t>
+              <a:t>4/21/2022</a:t>
             </a:fld>
             <a:endParaRPr lang="en-US"/>
           </a:p>
@@ -2949,7 +2961,7 @@
           <a:p>
             <a:fld id="{3212B134-D57A-47B0-9FC8-42672359FFDA}" type="datetimeFigureOut">
               <a:rPr lang="en-US" smtClean="0"/>
-              <a:t>4/5/22</a:t>
+              <a:t>4/21/2022</a:t>
             </a:fld>
             <a:endParaRPr lang="en-US"/>
           </a:p>
@@ -3119,7 +3131,7 @@
           <a:p>
             <a:fld id="{3212B134-D57A-47B0-9FC8-42672359FFDA}" type="datetimeFigureOut">
               <a:rPr lang="en-US" smtClean="0"/>
-              <a:t>4/5/22</a:t>
+              <a:t>4/21/2022</a:t>
             </a:fld>
             <a:endParaRPr lang="en-US"/>
           </a:p>
@@ -3299,7 +3311,7 @@
           <a:p>
             <a:fld id="{3212B134-D57A-47B0-9FC8-42672359FFDA}" type="datetimeFigureOut">
               <a:rPr lang="en-US" smtClean="0"/>
-              <a:t>4/5/22</a:t>
+              <a:t>4/21/2022</a:t>
             </a:fld>
             <a:endParaRPr lang="en-US"/>
           </a:p>
@@ -3469,7 +3481,7 @@
           <a:p>
             <a:fld id="{3212B134-D57A-47B0-9FC8-42672359FFDA}" type="datetimeFigureOut">
               <a:rPr lang="en-US" smtClean="0"/>
-              <a:t>4/5/22</a:t>
+              <a:t>4/21/2022</a:t>
             </a:fld>
             <a:endParaRPr lang="en-US"/>
           </a:p>
@@ -3716,7 +3728,7 @@
           <a:p>
             <a:fld id="{3212B134-D57A-47B0-9FC8-42672359FFDA}" type="datetimeFigureOut">
               <a:rPr lang="en-US" smtClean="0"/>
-              <a:t>4/5/22</a:t>
+              <a:t>4/21/2022</a:t>
             </a:fld>
             <a:endParaRPr lang="en-US"/>
           </a:p>
@@ -4008,7 +4020,7 @@
           <a:p>
             <a:fld id="{3212B134-D57A-47B0-9FC8-42672359FFDA}" type="datetimeFigureOut">
               <a:rPr lang="en-US" smtClean="0"/>
-              <a:t>4/5/22</a:t>
+              <a:t>4/21/2022</a:t>
             </a:fld>
             <a:endParaRPr lang="en-US"/>
           </a:p>
@@ -4452,7 +4464,7 @@
           <a:p>
             <a:fld id="{3212B134-D57A-47B0-9FC8-42672359FFDA}" type="datetimeFigureOut">
               <a:rPr lang="en-US" smtClean="0"/>
-              <a:t>4/5/22</a:t>
+              <a:t>4/21/2022</a:t>
             </a:fld>
             <a:endParaRPr lang="en-US"/>
           </a:p>
@@ -4570,7 +4582,7 @@
           <a:p>
             <a:fld id="{3212B134-D57A-47B0-9FC8-42672359FFDA}" type="datetimeFigureOut">
               <a:rPr lang="en-US" smtClean="0"/>
-              <a:t>4/5/22</a:t>
+              <a:t>4/21/2022</a:t>
             </a:fld>
             <a:endParaRPr lang="en-US"/>
           </a:p>
@@ -4665,7 +4677,7 @@
           <a:p>
             <a:fld id="{3212B134-D57A-47B0-9FC8-42672359FFDA}" type="datetimeFigureOut">
               <a:rPr lang="en-US" smtClean="0"/>
-              <a:t>4/5/22</a:t>
+              <a:t>4/21/2022</a:t>
             </a:fld>
             <a:endParaRPr lang="en-US"/>
           </a:p>
@@ -4944,7 +4956,7 @@
           <a:p>
             <a:fld id="{3212B134-D57A-47B0-9FC8-42672359FFDA}" type="datetimeFigureOut">
               <a:rPr lang="en-US" smtClean="0"/>
-              <a:t>4/5/22</a:t>
+              <a:t>4/21/2022</a:t>
             </a:fld>
             <a:endParaRPr lang="en-US"/>
           </a:p>
@@ -5219,7 +5231,7 @@
           <a:p>
             <a:fld id="{3212B134-D57A-47B0-9FC8-42672359FFDA}" type="datetimeFigureOut">
               <a:rPr lang="en-US" smtClean="0"/>
-              <a:t>4/5/22</a:t>
+              <a:t>4/21/2022</a:t>
             </a:fld>
             <a:endParaRPr lang="en-US"/>
           </a:p>
@@ -5284,9 +5296,38 @@
 <p:sldMaster xmlns:a="http://schemas.openxmlformats.org/drawingml/2006/main" xmlns:r="http://schemas.openxmlformats.org/officeDocument/2006/relationships" xmlns:p="http://schemas.openxmlformats.org/presentationml/2006/main">
   <p:cSld>
     <p:bg>
-      <p:bgRef idx="1003">
-        <a:schemeClr val="bg2"/>
-      </p:bgRef>
+      <p:bgPr>
+        <a:gradFill flip="none" rotWithShape="1">
+          <a:gsLst>
+            <a:gs pos="0">
+              <a:schemeClr val="accent1">
+                <a:lumMod val="5000"/>
+                <a:lumOff val="95000"/>
+              </a:schemeClr>
+            </a:gs>
+            <a:gs pos="100000">
+              <a:schemeClr val="accent1">
+                <a:lumMod val="45000"/>
+                <a:lumOff val="55000"/>
+              </a:schemeClr>
+            </a:gs>
+            <a:gs pos="0">
+              <a:schemeClr val="accent1">
+                <a:lumMod val="75000"/>
+              </a:schemeClr>
+            </a:gs>
+            <a:gs pos="100000">
+              <a:schemeClr val="accent1">
+                <a:lumMod val="30000"/>
+                <a:lumOff val="70000"/>
+              </a:schemeClr>
+            </a:gs>
+          </a:gsLst>
+          <a:lin ang="5400000" scaled="1"/>
+          <a:tileRect/>
+        </a:gradFill>
+        <a:effectLst/>
+      </p:bgPr>
     </p:bg>
     <p:spTree>
       <p:nvGrpSpPr>
@@ -5648,7 +5689,7 @@
           <a:p>
             <a:fld id="{3212B134-D57A-47B0-9FC8-42672359FFDA}" type="datetimeFigureOut">
               <a:rPr lang="en-US" smtClean="0"/>
-              <a:t>4/5/22</a:t>
+              <a:t>4/21/2022</a:t>
             </a:fld>
             <a:endParaRPr lang="en-US"/>
           </a:p>
@@ -6162,39 +6203,6 @@
 <file path=ppt/slides/slide1.xml><?xml version="1.0" encoding="utf-8"?>
 <p:sld xmlns:a="http://schemas.openxmlformats.org/drawingml/2006/main" xmlns:r="http://schemas.openxmlformats.org/officeDocument/2006/relationships" xmlns:p="http://schemas.openxmlformats.org/presentationml/2006/main">
   <p:cSld>
-    <p:bg>
-      <p:bgPr>
-        <a:gradFill>
-          <a:gsLst>
-            <a:gs pos="0">
-              <a:schemeClr val="accent1">
-                <a:lumMod val="75000"/>
-              </a:schemeClr>
-            </a:gs>
-            <a:gs pos="97000">
-              <a:schemeClr val="accent1">
-                <a:lumMod val="45000"/>
-                <a:lumOff val="55000"/>
-              </a:schemeClr>
-            </a:gs>
-            <a:gs pos="100000">
-              <a:schemeClr val="accent1">
-                <a:lumMod val="45000"/>
-                <a:lumOff val="55000"/>
-              </a:schemeClr>
-            </a:gs>
-            <a:gs pos="100000">
-              <a:schemeClr val="accent1">
-                <a:lumMod val="30000"/>
-                <a:lumOff val="70000"/>
-              </a:schemeClr>
-            </a:gs>
-          </a:gsLst>
-          <a:lin ang="5400000" scaled="1"/>
-        </a:gradFill>
-        <a:effectLst/>
-      </p:bgPr>
-    </p:bg>
     <p:spTree>
       <p:nvGrpSpPr>
         <p:cNvPr id="1" name=""/>
@@ -6325,39 +6333,6 @@
 <file path=ppt/slides/slide10.xml><?xml version="1.0" encoding="utf-8"?>
 <p:sld xmlns:a="http://schemas.openxmlformats.org/drawingml/2006/main" xmlns:r="http://schemas.openxmlformats.org/officeDocument/2006/relationships" xmlns:p="http://schemas.openxmlformats.org/presentationml/2006/main">
   <p:cSld>
-    <p:bg>
-      <p:bgPr>
-        <a:gradFill>
-          <a:gsLst>
-            <a:gs pos="0">
-              <a:schemeClr val="accent1">
-                <a:lumMod val="75000"/>
-              </a:schemeClr>
-            </a:gs>
-            <a:gs pos="97000">
-              <a:schemeClr val="accent1">
-                <a:lumMod val="45000"/>
-                <a:lumOff val="55000"/>
-              </a:schemeClr>
-            </a:gs>
-            <a:gs pos="100000">
-              <a:schemeClr val="accent1">
-                <a:lumMod val="45000"/>
-                <a:lumOff val="55000"/>
-              </a:schemeClr>
-            </a:gs>
-            <a:gs pos="100000">
-              <a:schemeClr val="accent1">
-                <a:lumMod val="30000"/>
-                <a:lumOff val="70000"/>
-              </a:schemeClr>
-            </a:gs>
-          </a:gsLst>
-          <a:lin ang="5400000" scaled="1"/>
-        </a:gradFill>
-        <a:effectLst/>
-      </p:bgPr>
-    </p:bg>
     <p:spTree>
       <p:nvGrpSpPr>
         <p:cNvPr id="1" name=""/>
@@ -6932,39 +6907,6 @@
 <file path=ppt/slides/slide11.xml><?xml version="1.0" encoding="utf-8"?>
 <p:sld xmlns:a="http://schemas.openxmlformats.org/drawingml/2006/main" xmlns:r="http://schemas.openxmlformats.org/officeDocument/2006/relationships" xmlns:p="http://schemas.openxmlformats.org/presentationml/2006/main">
   <p:cSld>
-    <p:bg>
-      <p:bgPr>
-        <a:gradFill>
-          <a:gsLst>
-            <a:gs pos="0">
-              <a:schemeClr val="accent1">
-                <a:lumMod val="75000"/>
-              </a:schemeClr>
-            </a:gs>
-            <a:gs pos="74000">
-              <a:schemeClr val="accent1">
-                <a:lumMod val="45000"/>
-                <a:lumOff val="55000"/>
-              </a:schemeClr>
-            </a:gs>
-            <a:gs pos="83000">
-              <a:schemeClr val="accent1">
-                <a:lumMod val="45000"/>
-                <a:lumOff val="55000"/>
-              </a:schemeClr>
-            </a:gs>
-            <a:gs pos="100000">
-              <a:schemeClr val="accent1">
-                <a:lumMod val="30000"/>
-                <a:lumOff val="70000"/>
-              </a:schemeClr>
-            </a:gs>
-          </a:gsLst>
-          <a:lin ang="5400000" scaled="1"/>
-        </a:gradFill>
-        <a:effectLst/>
-      </p:bgPr>
-    </p:bg>
     <p:spTree>
       <p:nvGrpSpPr>
         <p:cNvPr id="1" name=""/>
@@ -7063,39 +7005,6 @@
 <file path=ppt/slides/slide12.xml><?xml version="1.0" encoding="utf-8"?>
 <p:sld xmlns:a="http://schemas.openxmlformats.org/drawingml/2006/main" xmlns:r="http://schemas.openxmlformats.org/officeDocument/2006/relationships" xmlns:p="http://schemas.openxmlformats.org/presentationml/2006/main">
   <p:cSld>
-    <p:bg>
-      <p:bgPr>
-        <a:gradFill>
-          <a:gsLst>
-            <a:gs pos="0">
-              <a:schemeClr val="accent1">
-                <a:lumMod val="75000"/>
-              </a:schemeClr>
-            </a:gs>
-            <a:gs pos="74000">
-              <a:schemeClr val="accent1">
-                <a:lumMod val="45000"/>
-                <a:lumOff val="55000"/>
-              </a:schemeClr>
-            </a:gs>
-            <a:gs pos="83000">
-              <a:schemeClr val="accent1">
-                <a:lumMod val="45000"/>
-                <a:lumOff val="55000"/>
-              </a:schemeClr>
-            </a:gs>
-            <a:gs pos="100000">
-              <a:schemeClr val="accent1">
-                <a:lumMod val="30000"/>
-                <a:lumOff val="70000"/>
-              </a:schemeClr>
-            </a:gs>
-          </a:gsLst>
-          <a:lin ang="5400000" scaled="1"/>
-        </a:gradFill>
-        <a:effectLst/>
-      </p:bgPr>
-    </p:bg>
     <p:spTree>
       <p:nvGrpSpPr>
         <p:cNvPr id="1" name=""/>
@@ -7238,39 +7147,6 @@
 <file path=ppt/slides/slide13.xml><?xml version="1.0" encoding="utf-8"?>
 <p:sld xmlns:a="http://schemas.openxmlformats.org/drawingml/2006/main" xmlns:r="http://schemas.openxmlformats.org/officeDocument/2006/relationships" xmlns:p="http://schemas.openxmlformats.org/presentationml/2006/main">
   <p:cSld>
-    <p:bg>
-      <p:bgPr>
-        <a:gradFill>
-          <a:gsLst>
-            <a:gs pos="0">
-              <a:schemeClr val="accent1">
-                <a:lumMod val="75000"/>
-              </a:schemeClr>
-            </a:gs>
-            <a:gs pos="74000">
-              <a:schemeClr val="accent1">
-                <a:lumMod val="45000"/>
-                <a:lumOff val="55000"/>
-              </a:schemeClr>
-            </a:gs>
-            <a:gs pos="83000">
-              <a:schemeClr val="accent1">
-                <a:lumMod val="45000"/>
-                <a:lumOff val="55000"/>
-              </a:schemeClr>
-            </a:gs>
-            <a:gs pos="100000">
-              <a:schemeClr val="accent1">
-                <a:lumMod val="30000"/>
-                <a:lumOff val="70000"/>
-              </a:schemeClr>
-            </a:gs>
-          </a:gsLst>
-          <a:lin ang="5400000" scaled="1"/>
-        </a:gradFill>
-        <a:effectLst/>
-      </p:bgPr>
-    </p:bg>
     <p:spTree>
       <p:nvGrpSpPr>
         <p:cNvPr id="1" name=""/>
@@ -7378,39 +7254,6 @@
 <file path=ppt/slides/slide14.xml><?xml version="1.0" encoding="utf-8"?>
 <p:sld xmlns:a="http://schemas.openxmlformats.org/drawingml/2006/main" xmlns:r="http://schemas.openxmlformats.org/officeDocument/2006/relationships" xmlns:p="http://schemas.openxmlformats.org/presentationml/2006/main">
   <p:cSld>
-    <p:bg>
-      <p:bgPr>
-        <a:gradFill>
-          <a:gsLst>
-            <a:gs pos="0">
-              <a:schemeClr val="accent1">
-                <a:lumMod val="75000"/>
-              </a:schemeClr>
-            </a:gs>
-            <a:gs pos="74000">
-              <a:schemeClr val="accent1">
-                <a:lumMod val="45000"/>
-                <a:lumOff val="55000"/>
-              </a:schemeClr>
-            </a:gs>
-            <a:gs pos="83000">
-              <a:schemeClr val="accent1">
-                <a:lumMod val="45000"/>
-                <a:lumOff val="55000"/>
-              </a:schemeClr>
-            </a:gs>
-            <a:gs pos="100000">
-              <a:schemeClr val="accent1">
-                <a:lumMod val="30000"/>
-                <a:lumOff val="70000"/>
-              </a:schemeClr>
-            </a:gs>
-          </a:gsLst>
-          <a:lin ang="5400000" scaled="1"/>
-        </a:gradFill>
-        <a:effectLst/>
-      </p:bgPr>
-    </p:bg>
     <p:spTree>
       <p:nvGrpSpPr>
         <p:cNvPr id="1" name=""/>
@@ -7518,39 +7361,6 @@
 <file path=ppt/slides/slide15.xml><?xml version="1.0" encoding="utf-8"?>
 <p:sld xmlns:a="http://schemas.openxmlformats.org/drawingml/2006/main" xmlns:r="http://schemas.openxmlformats.org/officeDocument/2006/relationships" xmlns:p="http://schemas.openxmlformats.org/presentationml/2006/main">
   <p:cSld>
-    <p:bg>
-      <p:bgPr>
-        <a:gradFill>
-          <a:gsLst>
-            <a:gs pos="0">
-              <a:schemeClr val="accent1">
-                <a:lumMod val="75000"/>
-              </a:schemeClr>
-            </a:gs>
-            <a:gs pos="74000">
-              <a:schemeClr val="accent1">
-                <a:lumMod val="45000"/>
-                <a:lumOff val="55000"/>
-              </a:schemeClr>
-            </a:gs>
-            <a:gs pos="83000">
-              <a:schemeClr val="accent1">
-                <a:lumMod val="45000"/>
-                <a:lumOff val="55000"/>
-              </a:schemeClr>
-            </a:gs>
-            <a:gs pos="100000">
-              <a:schemeClr val="accent1">
-                <a:lumMod val="30000"/>
-                <a:lumOff val="70000"/>
-              </a:schemeClr>
-            </a:gs>
-          </a:gsLst>
-          <a:lin ang="5400000" scaled="1"/>
-        </a:gradFill>
-        <a:effectLst/>
-      </p:bgPr>
-    </p:bg>
     <p:spTree>
       <p:nvGrpSpPr>
         <p:cNvPr id="1" name=""/>
@@ -7664,39 +7474,6 @@
 <file path=ppt/slides/slide16.xml><?xml version="1.0" encoding="utf-8"?>
 <p:sld xmlns:a="http://schemas.openxmlformats.org/drawingml/2006/main" xmlns:r="http://schemas.openxmlformats.org/officeDocument/2006/relationships" xmlns:p="http://schemas.openxmlformats.org/presentationml/2006/main">
   <p:cSld>
-    <p:bg>
-      <p:bgPr>
-        <a:gradFill>
-          <a:gsLst>
-            <a:gs pos="0">
-              <a:schemeClr val="accent1">
-                <a:lumMod val="75000"/>
-              </a:schemeClr>
-            </a:gs>
-            <a:gs pos="74000">
-              <a:schemeClr val="accent1">
-                <a:lumMod val="45000"/>
-                <a:lumOff val="55000"/>
-              </a:schemeClr>
-            </a:gs>
-            <a:gs pos="83000">
-              <a:schemeClr val="accent1">
-                <a:lumMod val="45000"/>
-                <a:lumOff val="55000"/>
-              </a:schemeClr>
-            </a:gs>
-            <a:gs pos="100000">
-              <a:schemeClr val="accent1">
-                <a:lumMod val="30000"/>
-                <a:lumOff val="70000"/>
-              </a:schemeClr>
-            </a:gs>
-          </a:gsLst>
-          <a:lin ang="5400000" scaled="1"/>
-        </a:gradFill>
-        <a:effectLst/>
-      </p:bgPr>
-    </p:bg>
     <p:spTree>
       <p:nvGrpSpPr>
         <p:cNvPr id="1" name=""/>
@@ -7815,39 +7592,6 @@
 <file path=ppt/slides/slide17.xml><?xml version="1.0" encoding="utf-8"?>
 <p:sld xmlns:a="http://schemas.openxmlformats.org/drawingml/2006/main" xmlns:r="http://schemas.openxmlformats.org/officeDocument/2006/relationships" xmlns:p="http://schemas.openxmlformats.org/presentationml/2006/main">
   <p:cSld>
-    <p:bg>
-      <p:bgPr>
-        <a:gradFill>
-          <a:gsLst>
-            <a:gs pos="0">
-              <a:schemeClr val="accent1">
-                <a:lumMod val="75000"/>
-              </a:schemeClr>
-            </a:gs>
-            <a:gs pos="74000">
-              <a:schemeClr val="accent1">
-                <a:lumMod val="45000"/>
-                <a:lumOff val="55000"/>
-              </a:schemeClr>
-            </a:gs>
-            <a:gs pos="83000">
-              <a:schemeClr val="accent1">
-                <a:lumMod val="45000"/>
-                <a:lumOff val="55000"/>
-              </a:schemeClr>
-            </a:gs>
-            <a:gs pos="100000">
-              <a:schemeClr val="accent1">
-                <a:lumMod val="30000"/>
-                <a:lumOff val="70000"/>
-              </a:schemeClr>
-            </a:gs>
-          </a:gsLst>
-          <a:lin ang="5400000" scaled="1"/>
-        </a:gradFill>
-        <a:effectLst/>
-      </p:bgPr>
-    </p:bg>
     <p:spTree>
       <p:nvGrpSpPr>
         <p:cNvPr id="1" name=""/>
@@ -8022,39 +7766,6 @@
 <file path=ppt/slides/slide18.xml><?xml version="1.0" encoding="utf-8"?>
 <p:sld xmlns:a="http://schemas.openxmlformats.org/drawingml/2006/main" xmlns:r="http://schemas.openxmlformats.org/officeDocument/2006/relationships" xmlns:p="http://schemas.openxmlformats.org/presentationml/2006/main">
   <p:cSld>
-    <p:bg>
-      <p:bgPr>
-        <a:gradFill>
-          <a:gsLst>
-            <a:gs pos="0">
-              <a:schemeClr val="accent1">
-                <a:lumMod val="75000"/>
-              </a:schemeClr>
-            </a:gs>
-            <a:gs pos="74000">
-              <a:schemeClr val="accent1">
-                <a:lumMod val="45000"/>
-                <a:lumOff val="55000"/>
-              </a:schemeClr>
-            </a:gs>
-            <a:gs pos="83000">
-              <a:schemeClr val="accent1">
-                <a:lumMod val="45000"/>
-                <a:lumOff val="55000"/>
-              </a:schemeClr>
-            </a:gs>
-            <a:gs pos="100000">
-              <a:schemeClr val="accent1">
-                <a:lumMod val="30000"/>
-                <a:lumOff val="70000"/>
-              </a:schemeClr>
-            </a:gs>
-          </a:gsLst>
-          <a:lin ang="5400000" scaled="1"/>
-        </a:gradFill>
-        <a:effectLst/>
-      </p:bgPr>
-    </p:bg>
     <p:spTree>
       <p:nvGrpSpPr>
         <p:cNvPr id="1" name=""/>
@@ -8188,39 +7899,6 @@
 <file path=ppt/slides/slide19.xml><?xml version="1.0" encoding="utf-8"?>
 <p:sld xmlns:a="http://schemas.openxmlformats.org/drawingml/2006/main" xmlns:r="http://schemas.openxmlformats.org/officeDocument/2006/relationships" xmlns:p="http://schemas.openxmlformats.org/presentationml/2006/main">
   <p:cSld>
-    <p:bg>
-      <p:bgPr>
-        <a:gradFill>
-          <a:gsLst>
-            <a:gs pos="0">
-              <a:schemeClr val="accent1">
-                <a:lumMod val="75000"/>
-              </a:schemeClr>
-            </a:gs>
-            <a:gs pos="74000">
-              <a:schemeClr val="accent1">
-                <a:lumMod val="45000"/>
-                <a:lumOff val="55000"/>
-              </a:schemeClr>
-            </a:gs>
-            <a:gs pos="83000">
-              <a:schemeClr val="accent1">
-                <a:lumMod val="45000"/>
-                <a:lumOff val="55000"/>
-              </a:schemeClr>
-            </a:gs>
-            <a:gs pos="100000">
-              <a:schemeClr val="accent1">
-                <a:lumMod val="30000"/>
-                <a:lumOff val="70000"/>
-              </a:schemeClr>
-            </a:gs>
-          </a:gsLst>
-          <a:lin ang="5400000" scaled="1"/>
-        </a:gradFill>
-        <a:effectLst/>
-      </p:bgPr>
-    </p:bg>
     <p:spTree>
       <p:nvGrpSpPr>
         <p:cNvPr id="1" name=""/>
@@ -8319,38 +7997,6 @@
 <file path=ppt/slides/slide2.xml><?xml version="1.0" encoding="utf-8"?>
 <p:sld xmlns:a="http://schemas.openxmlformats.org/drawingml/2006/main" xmlns:r="http://schemas.openxmlformats.org/officeDocument/2006/relationships" xmlns:p="http://schemas.openxmlformats.org/presentationml/2006/main">
   <p:cSld>
-    <p:bg>
-      <p:bgPr>
-        <a:gradFill>
-          <a:gsLst>
-            <a:gs pos="0">
-              <a:schemeClr val="accent1">
-                <a:lumMod val="75000"/>
-              </a:schemeClr>
-            </a:gs>
-            <a:gs pos="100000">
-              <a:schemeClr val="accent1">
-                <a:lumMod val="45000"/>
-                <a:lumOff val="55000"/>
-              </a:schemeClr>
-            </a:gs>
-            <a:gs pos="100000">
-              <a:schemeClr val="accent1">
-                <a:lumMod val="75000"/>
-              </a:schemeClr>
-            </a:gs>
-            <a:gs pos="100000">
-              <a:schemeClr val="accent1">
-                <a:lumMod val="30000"/>
-                <a:lumOff val="70000"/>
-              </a:schemeClr>
-            </a:gs>
-          </a:gsLst>
-          <a:lin ang="5400000" scaled="1"/>
-        </a:gradFill>
-        <a:effectLst/>
-      </p:bgPr>
-    </p:bg>
     <p:spTree>
       <p:nvGrpSpPr>
         <p:cNvPr id="1" name=""/>
@@ -8485,39 +8131,6 @@
 <file path=ppt/slides/slide20.xml><?xml version="1.0" encoding="utf-8"?>
 <p:sld xmlns:a="http://schemas.openxmlformats.org/drawingml/2006/main" xmlns:r="http://schemas.openxmlformats.org/officeDocument/2006/relationships" xmlns:p="http://schemas.openxmlformats.org/presentationml/2006/main">
   <p:cSld>
-    <p:bg>
-      <p:bgPr>
-        <a:gradFill>
-          <a:gsLst>
-            <a:gs pos="0">
-              <a:schemeClr val="accent1">
-                <a:lumMod val="75000"/>
-              </a:schemeClr>
-            </a:gs>
-            <a:gs pos="74000">
-              <a:schemeClr val="accent1">
-                <a:lumMod val="45000"/>
-                <a:lumOff val="55000"/>
-              </a:schemeClr>
-            </a:gs>
-            <a:gs pos="83000">
-              <a:schemeClr val="accent1">
-                <a:lumMod val="45000"/>
-                <a:lumOff val="55000"/>
-              </a:schemeClr>
-            </a:gs>
-            <a:gs pos="100000">
-              <a:schemeClr val="accent1">
-                <a:lumMod val="30000"/>
-                <a:lumOff val="70000"/>
-              </a:schemeClr>
-            </a:gs>
-          </a:gsLst>
-          <a:lin ang="5400000" scaled="1"/>
-        </a:gradFill>
-        <a:effectLst/>
-      </p:bgPr>
-    </p:bg>
     <p:spTree>
       <p:nvGrpSpPr>
         <p:cNvPr id="1" name=""/>
@@ -8669,39 +8282,6 @@
 <file path=ppt/slides/slide21.xml><?xml version="1.0" encoding="utf-8"?>
 <p:sld xmlns:a="http://schemas.openxmlformats.org/drawingml/2006/main" xmlns:r="http://schemas.openxmlformats.org/officeDocument/2006/relationships" xmlns:p="http://schemas.openxmlformats.org/presentationml/2006/main">
   <p:cSld>
-    <p:bg>
-      <p:bgPr>
-        <a:gradFill>
-          <a:gsLst>
-            <a:gs pos="0">
-              <a:schemeClr val="accent1">
-                <a:lumMod val="75000"/>
-              </a:schemeClr>
-            </a:gs>
-            <a:gs pos="100000">
-              <a:schemeClr val="accent1">
-                <a:lumMod val="45000"/>
-                <a:lumOff val="55000"/>
-              </a:schemeClr>
-            </a:gs>
-            <a:gs pos="100000">
-              <a:schemeClr val="accent1">
-                <a:lumMod val="45000"/>
-                <a:lumOff val="55000"/>
-              </a:schemeClr>
-            </a:gs>
-            <a:gs pos="100000">
-              <a:schemeClr val="accent1">
-                <a:lumMod val="30000"/>
-                <a:lumOff val="70000"/>
-              </a:schemeClr>
-            </a:gs>
-          </a:gsLst>
-          <a:lin ang="5400000" scaled="1"/>
-        </a:gradFill>
-        <a:effectLst/>
-      </p:bgPr>
-    </p:bg>
     <p:spTree>
       <p:nvGrpSpPr>
         <p:cNvPr id="1" name=""/>
@@ -8796,39 +8376,6 @@
 <file path=ppt/slides/slide22.xml><?xml version="1.0" encoding="utf-8"?>
 <p:sld xmlns:a="http://schemas.openxmlformats.org/drawingml/2006/main" xmlns:r="http://schemas.openxmlformats.org/officeDocument/2006/relationships" xmlns:p="http://schemas.openxmlformats.org/presentationml/2006/main">
   <p:cSld>
-    <p:bg>
-      <p:bgPr>
-        <a:gradFill>
-          <a:gsLst>
-            <a:gs pos="0">
-              <a:schemeClr val="accent1">
-                <a:lumMod val="75000"/>
-              </a:schemeClr>
-            </a:gs>
-            <a:gs pos="100000">
-              <a:schemeClr val="accent1">
-                <a:lumMod val="45000"/>
-                <a:lumOff val="55000"/>
-              </a:schemeClr>
-            </a:gs>
-            <a:gs pos="100000">
-              <a:schemeClr val="accent1">
-                <a:lumMod val="45000"/>
-                <a:lumOff val="55000"/>
-              </a:schemeClr>
-            </a:gs>
-            <a:gs pos="100000">
-              <a:schemeClr val="accent1">
-                <a:lumMod val="30000"/>
-                <a:lumOff val="70000"/>
-              </a:schemeClr>
-            </a:gs>
-          </a:gsLst>
-          <a:lin ang="5400000" scaled="1"/>
-        </a:gradFill>
-        <a:effectLst/>
-      </p:bgPr>
-    </p:bg>
     <p:spTree>
       <p:nvGrpSpPr>
         <p:cNvPr id="1" name=""/>
@@ -8959,39 +8506,6 @@
 <file path=ppt/slides/slide23.xml><?xml version="1.0" encoding="utf-8"?>
 <p:sld xmlns:a="http://schemas.openxmlformats.org/drawingml/2006/main" xmlns:r="http://schemas.openxmlformats.org/officeDocument/2006/relationships" xmlns:p="http://schemas.openxmlformats.org/presentationml/2006/main">
   <p:cSld>
-    <p:bg>
-      <p:bgPr>
-        <a:gradFill>
-          <a:gsLst>
-            <a:gs pos="0">
-              <a:schemeClr val="accent1">
-                <a:lumMod val="75000"/>
-              </a:schemeClr>
-            </a:gs>
-            <a:gs pos="100000">
-              <a:schemeClr val="accent1">
-                <a:lumMod val="45000"/>
-                <a:lumOff val="55000"/>
-              </a:schemeClr>
-            </a:gs>
-            <a:gs pos="100000">
-              <a:schemeClr val="accent1">
-                <a:lumMod val="45000"/>
-                <a:lumOff val="55000"/>
-              </a:schemeClr>
-            </a:gs>
-            <a:gs pos="100000">
-              <a:schemeClr val="accent1">
-                <a:lumMod val="30000"/>
-                <a:lumOff val="70000"/>
-              </a:schemeClr>
-            </a:gs>
-          </a:gsLst>
-          <a:lin ang="5400000" scaled="1"/>
-        </a:gradFill>
-        <a:effectLst/>
-      </p:bgPr>
-    </p:bg>
     <p:spTree>
       <p:nvGrpSpPr>
         <p:cNvPr id="1" name=""/>
@@ -9193,39 +8707,6 @@
 <file path=ppt/slides/slide24.xml><?xml version="1.0" encoding="utf-8"?>
 <p:sld xmlns:a="http://schemas.openxmlformats.org/drawingml/2006/main" xmlns:r="http://schemas.openxmlformats.org/officeDocument/2006/relationships" xmlns:p="http://schemas.openxmlformats.org/presentationml/2006/main">
   <p:cSld>
-    <p:bg>
-      <p:bgPr>
-        <a:gradFill>
-          <a:gsLst>
-            <a:gs pos="0">
-              <a:schemeClr val="accent1">
-                <a:lumMod val="75000"/>
-              </a:schemeClr>
-            </a:gs>
-            <a:gs pos="100000">
-              <a:schemeClr val="accent1">
-                <a:lumMod val="45000"/>
-                <a:lumOff val="55000"/>
-              </a:schemeClr>
-            </a:gs>
-            <a:gs pos="100000">
-              <a:schemeClr val="accent1">
-                <a:lumMod val="45000"/>
-                <a:lumOff val="55000"/>
-              </a:schemeClr>
-            </a:gs>
-            <a:gs pos="100000">
-              <a:schemeClr val="accent1">
-                <a:lumMod val="30000"/>
-                <a:lumOff val="70000"/>
-              </a:schemeClr>
-            </a:gs>
-          </a:gsLst>
-          <a:lin ang="5400000" scaled="1"/>
-        </a:gradFill>
-        <a:effectLst/>
-      </p:bgPr>
-    </p:bg>
     <p:spTree>
       <p:nvGrpSpPr>
         <p:cNvPr id="1" name=""/>
@@ -9360,39 +8841,6 @@
 <file path=ppt/slides/slide25.xml><?xml version="1.0" encoding="utf-8"?>
 <p:sld xmlns:a="http://schemas.openxmlformats.org/drawingml/2006/main" xmlns:r="http://schemas.openxmlformats.org/officeDocument/2006/relationships" xmlns:p="http://schemas.openxmlformats.org/presentationml/2006/main">
   <p:cSld>
-    <p:bg>
-      <p:bgPr>
-        <a:gradFill>
-          <a:gsLst>
-            <a:gs pos="0">
-              <a:schemeClr val="accent1">
-                <a:lumMod val="75000"/>
-              </a:schemeClr>
-            </a:gs>
-            <a:gs pos="100000">
-              <a:schemeClr val="accent1">
-                <a:lumMod val="45000"/>
-                <a:lumOff val="55000"/>
-              </a:schemeClr>
-            </a:gs>
-            <a:gs pos="100000">
-              <a:schemeClr val="accent1">
-                <a:lumMod val="45000"/>
-                <a:lumOff val="55000"/>
-              </a:schemeClr>
-            </a:gs>
-            <a:gs pos="100000">
-              <a:schemeClr val="accent1">
-                <a:lumMod val="30000"/>
-                <a:lumOff val="70000"/>
-              </a:schemeClr>
-            </a:gs>
-          </a:gsLst>
-          <a:lin ang="5400000" scaled="1"/>
-        </a:gradFill>
-        <a:effectLst/>
-      </p:bgPr>
-    </p:bg>
     <p:spTree>
       <p:nvGrpSpPr>
         <p:cNvPr id="1" name=""/>
@@ -9527,39 +8975,6 @@
 <file path=ppt/slides/slide26.xml><?xml version="1.0" encoding="utf-8"?>
 <p:sld xmlns:a="http://schemas.openxmlformats.org/drawingml/2006/main" xmlns:r="http://schemas.openxmlformats.org/officeDocument/2006/relationships" xmlns:p="http://schemas.openxmlformats.org/presentationml/2006/main">
   <p:cSld>
-    <p:bg>
-      <p:bgPr>
-        <a:gradFill>
-          <a:gsLst>
-            <a:gs pos="0">
-              <a:schemeClr val="accent1">
-                <a:lumMod val="75000"/>
-              </a:schemeClr>
-            </a:gs>
-            <a:gs pos="100000">
-              <a:schemeClr val="accent1">
-                <a:lumMod val="45000"/>
-                <a:lumOff val="55000"/>
-              </a:schemeClr>
-            </a:gs>
-            <a:gs pos="100000">
-              <a:schemeClr val="accent1">
-                <a:lumMod val="45000"/>
-                <a:lumOff val="55000"/>
-              </a:schemeClr>
-            </a:gs>
-            <a:gs pos="100000">
-              <a:schemeClr val="accent1">
-                <a:lumMod val="30000"/>
-                <a:lumOff val="70000"/>
-              </a:schemeClr>
-            </a:gs>
-          </a:gsLst>
-          <a:lin ang="5400000" scaled="1"/>
-        </a:gradFill>
-        <a:effectLst/>
-      </p:bgPr>
-    </p:bg>
     <p:spTree>
       <p:nvGrpSpPr>
         <p:cNvPr id="1" name=""/>
@@ -9708,39 +9123,6 @@
 <file path=ppt/slides/slide27.xml><?xml version="1.0" encoding="utf-8"?>
 <p:sld xmlns:a="http://schemas.openxmlformats.org/drawingml/2006/main" xmlns:r="http://schemas.openxmlformats.org/officeDocument/2006/relationships" xmlns:p="http://schemas.openxmlformats.org/presentationml/2006/main">
   <p:cSld>
-    <p:bg>
-      <p:bgPr>
-        <a:gradFill>
-          <a:gsLst>
-            <a:gs pos="0">
-              <a:schemeClr val="accent1">
-                <a:lumMod val="75000"/>
-              </a:schemeClr>
-            </a:gs>
-            <a:gs pos="100000">
-              <a:schemeClr val="accent1">
-                <a:lumMod val="45000"/>
-                <a:lumOff val="55000"/>
-              </a:schemeClr>
-            </a:gs>
-            <a:gs pos="100000">
-              <a:schemeClr val="accent1">
-                <a:lumMod val="45000"/>
-                <a:lumOff val="55000"/>
-              </a:schemeClr>
-            </a:gs>
-            <a:gs pos="100000">
-              <a:schemeClr val="accent1">
-                <a:lumMod val="30000"/>
-                <a:lumOff val="70000"/>
-              </a:schemeClr>
-            </a:gs>
-          </a:gsLst>
-          <a:lin ang="5400000" scaled="1"/>
-        </a:gradFill>
-        <a:effectLst/>
-      </p:bgPr>
-    </p:bg>
     <p:spTree>
       <p:nvGrpSpPr>
         <p:cNvPr id="1" name=""/>
@@ -9886,39 +9268,6 @@
 <file path=ppt/slides/slide28.xml><?xml version="1.0" encoding="utf-8"?>
 <p:sld xmlns:a="http://schemas.openxmlformats.org/drawingml/2006/main" xmlns:r="http://schemas.openxmlformats.org/officeDocument/2006/relationships" xmlns:p="http://schemas.openxmlformats.org/presentationml/2006/main">
   <p:cSld>
-    <p:bg>
-      <p:bgPr>
-        <a:gradFill>
-          <a:gsLst>
-            <a:gs pos="0">
-              <a:schemeClr val="accent1">
-                <a:lumMod val="75000"/>
-              </a:schemeClr>
-            </a:gs>
-            <a:gs pos="100000">
-              <a:schemeClr val="accent1">
-                <a:lumMod val="45000"/>
-                <a:lumOff val="55000"/>
-              </a:schemeClr>
-            </a:gs>
-            <a:gs pos="100000">
-              <a:schemeClr val="accent1">
-                <a:lumMod val="45000"/>
-                <a:lumOff val="55000"/>
-              </a:schemeClr>
-            </a:gs>
-            <a:gs pos="100000">
-              <a:schemeClr val="accent1">
-                <a:lumMod val="30000"/>
-                <a:lumOff val="70000"/>
-              </a:schemeClr>
-            </a:gs>
-          </a:gsLst>
-          <a:lin ang="5400000" scaled="1"/>
-        </a:gradFill>
-        <a:effectLst/>
-      </p:bgPr>
-    </p:bg>
     <p:spTree>
       <p:nvGrpSpPr>
         <p:cNvPr id="1" name=""/>
@@ -10070,39 +9419,6 @@
 <file path=ppt/slides/slide29.xml><?xml version="1.0" encoding="utf-8"?>
 <p:sld xmlns:a="http://schemas.openxmlformats.org/drawingml/2006/main" xmlns:r="http://schemas.openxmlformats.org/officeDocument/2006/relationships" xmlns:p="http://schemas.openxmlformats.org/presentationml/2006/main">
   <p:cSld>
-    <p:bg>
-      <p:bgPr>
-        <a:gradFill>
-          <a:gsLst>
-            <a:gs pos="0">
-              <a:schemeClr val="accent1">
-                <a:lumMod val="75000"/>
-              </a:schemeClr>
-            </a:gs>
-            <a:gs pos="100000">
-              <a:schemeClr val="accent1">
-                <a:lumMod val="45000"/>
-                <a:lumOff val="55000"/>
-              </a:schemeClr>
-            </a:gs>
-            <a:gs pos="100000">
-              <a:schemeClr val="accent1">
-                <a:lumMod val="45000"/>
-                <a:lumOff val="55000"/>
-              </a:schemeClr>
-            </a:gs>
-            <a:gs pos="100000">
-              <a:schemeClr val="accent1">
-                <a:lumMod val="30000"/>
-                <a:lumOff val="70000"/>
-              </a:schemeClr>
-            </a:gs>
-          </a:gsLst>
-          <a:lin ang="5400000" scaled="1"/>
-        </a:gradFill>
-        <a:effectLst/>
-      </p:bgPr>
-    </p:bg>
     <p:spTree>
       <p:nvGrpSpPr>
         <p:cNvPr id="1" name=""/>
@@ -10236,39 +9552,6 @@
 <file path=ppt/slides/slide3.xml><?xml version="1.0" encoding="utf-8"?>
 <p:sld xmlns:a="http://schemas.openxmlformats.org/drawingml/2006/main" xmlns:r="http://schemas.openxmlformats.org/officeDocument/2006/relationships" xmlns:p="http://schemas.openxmlformats.org/presentationml/2006/main">
   <p:cSld>
-    <p:bg>
-      <p:bgPr>
-        <a:gradFill>
-          <a:gsLst>
-            <a:gs pos="0">
-              <a:schemeClr val="accent1">
-                <a:lumMod val="75000"/>
-              </a:schemeClr>
-            </a:gs>
-            <a:gs pos="97000">
-              <a:schemeClr val="accent1">
-                <a:lumMod val="45000"/>
-                <a:lumOff val="55000"/>
-              </a:schemeClr>
-            </a:gs>
-            <a:gs pos="100000">
-              <a:schemeClr val="accent1">
-                <a:lumMod val="45000"/>
-                <a:lumOff val="55000"/>
-              </a:schemeClr>
-            </a:gs>
-            <a:gs pos="100000">
-              <a:schemeClr val="accent1">
-                <a:lumMod val="30000"/>
-                <a:lumOff val="70000"/>
-              </a:schemeClr>
-            </a:gs>
-          </a:gsLst>
-          <a:lin ang="5400000" scaled="1"/>
-        </a:gradFill>
-        <a:effectLst/>
-      </p:bgPr>
-    </p:bg>
     <p:spTree>
       <p:nvGrpSpPr>
         <p:cNvPr id="1" name=""/>
@@ -10465,39 +9748,6 @@
 <file path=ppt/slides/slide30.xml><?xml version="1.0" encoding="utf-8"?>
 <p:sld xmlns:a="http://schemas.openxmlformats.org/drawingml/2006/main" xmlns:r="http://schemas.openxmlformats.org/officeDocument/2006/relationships" xmlns:p="http://schemas.openxmlformats.org/presentationml/2006/main">
   <p:cSld>
-    <p:bg>
-      <p:bgPr>
-        <a:gradFill>
-          <a:gsLst>
-            <a:gs pos="0">
-              <a:schemeClr val="accent1">
-                <a:lumMod val="75000"/>
-              </a:schemeClr>
-            </a:gs>
-            <a:gs pos="100000">
-              <a:schemeClr val="accent1">
-                <a:lumMod val="45000"/>
-                <a:lumOff val="55000"/>
-              </a:schemeClr>
-            </a:gs>
-            <a:gs pos="100000">
-              <a:schemeClr val="accent1">
-                <a:lumMod val="45000"/>
-                <a:lumOff val="55000"/>
-              </a:schemeClr>
-            </a:gs>
-            <a:gs pos="100000">
-              <a:schemeClr val="accent1">
-                <a:lumMod val="30000"/>
-                <a:lumOff val="70000"/>
-              </a:schemeClr>
-            </a:gs>
-          </a:gsLst>
-          <a:lin ang="5400000" scaled="1"/>
-        </a:gradFill>
-        <a:effectLst/>
-      </p:bgPr>
-    </p:bg>
     <p:spTree>
       <p:nvGrpSpPr>
         <p:cNvPr id="1" name=""/>
@@ -10662,39 +9912,6 @@
 <file path=ppt/slides/slide31.xml><?xml version="1.0" encoding="utf-8"?>
 <p:sld xmlns:a="http://schemas.openxmlformats.org/drawingml/2006/main" xmlns:r="http://schemas.openxmlformats.org/officeDocument/2006/relationships" xmlns:p="http://schemas.openxmlformats.org/presentationml/2006/main">
   <p:cSld>
-    <p:bg>
-      <p:bgPr>
-        <a:gradFill>
-          <a:gsLst>
-            <a:gs pos="0">
-              <a:schemeClr val="accent1">
-                <a:lumMod val="75000"/>
-              </a:schemeClr>
-            </a:gs>
-            <a:gs pos="100000">
-              <a:schemeClr val="accent1">
-                <a:lumMod val="45000"/>
-                <a:lumOff val="55000"/>
-              </a:schemeClr>
-            </a:gs>
-            <a:gs pos="100000">
-              <a:schemeClr val="accent1">
-                <a:lumMod val="45000"/>
-                <a:lumOff val="55000"/>
-              </a:schemeClr>
-            </a:gs>
-            <a:gs pos="100000">
-              <a:schemeClr val="accent1">
-                <a:lumMod val="30000"/>
-                <a:lumOff val="70000"/>
-              </a:schemeClr>
-            </a:gs>
-          </a:gsLst>
-          <a:lin ang="5400000" scaled="1"/>
-        </a:gradFill>
-        <a:effectLst/>
-      </p:bgPr>
-    </p:bg>
     <p:spTree>
       <p:nvGrpSpPr>
         <p:cNvPr id="1" name=""/>
@@ -10848,39 +10065,6 @@
 <file path=ppt/slides/slide32.xml><?xml version="1.0" encoding="utf-8"?>
 <p:sld xmlns:a="http://schemas.openxmlformats.org/drawingml/2006/main" xmlns:r="http://schemas.openxmlformats.org/officeDocument/2006/relationships" xmlns:p="http://schemas.openxmlformats.org/presentationml/2006/main">
   <p:cSld>
-    <p:bg>
-      <p:bgPr>
-        <a:gradFill>
-          <a:gsLst>
-            <a:gs pos="0">
-              <a:schemeClr val="accent1">
-                <a:lumMod val="75000"/>
-              </a:schemeClr>
-            </a:gs>
-            <a:gs pos="100000">
-              <a:schemeClr val="accent1">
-                <a:lumMod val="45000"/>
-                <a:lumOff val="55000"/>
-              </a:schemeClr>
-            </a:gs>
-            <a:gs pos="100000">
-              <a:schemeClr val="accent1">
-                <a:lumMod val="45000"/>
-                <a:lumOff val="55000"/>
-              </a:schemeClr>
-            </a:gs>
-            <a:gs pos="100000">
-              <a:schemeClr val="accent1">
-                <a:lumMod val="30000"/>
-                <a:lumOff val="70000"/>
-              </a:schemeClr>
-            </a:gs>
-          </a:gsLst>
-          <a:lin ang="5400000" scaled="1"/>
-        </a:gradFill>
-        <a:effectLst/>
-      </p:bgPr>
-    </p:bg>
     <p:spTree>
       <p:nvGrpSpPr>
         <p:cNvPr id="1" name=""/>
@@ -10989,39 +10173,6 @@
 <file path=ppt/slides/slide33.xml><?xml version="1.0" encoding="utf-8"?>
 <p:sld xmlns:a="http://schemas.openxmlformats.org/drawingml/2006/main" xmlns:r="http://schemas.openxmlformats.org/officeDocument/2006/relationships" xmlns:p="http://schemas.openxmlformats.org/presentationml/2006/main">
   <p:cSld>
-    <p:bg>
-      <p:bgPr>
-        <a:gradFill>
-          <a:gsLst>
-            <a:gs pos="0">
-              <a:schemeClr val="accent1">
-                <a:lumMod val="75000"/>
-              </a:schemeClr>
-            </a:gs>
-            <a:gs pos="100000">
-              <a:schemeClr val="accent1">
-                <a:lumMod val="45000"/>
-                <a:lumOff val="55000"/>
-              </a:schemeClr>
-            </a:gs>
-            <a:gs pos="100000">
-              <a:schemeClr val="accent1">
-                <a:lumMod val="45000"/>
-                <a:lumOff val="55000"/>
-              </a:schemeClr>
-            </a:gs>
-            <a:gs pos="100000">
-              <a:schemeClr val="accent1">
-                <a:lumMod val="30000"/>
-                <a:lumOff val="70000"/>
-              </a:schemeClr>
-            </a:gs>
-          </a:gsLst>
-          <a:lin ang="5400000" scaled="1"/>
-        </a:gradFill>
-        <a:effectLst/>
-      </p:bgPr>
-    </p:bg>
     <p:spTree>
       <p:nvGrpSpPr>
         <p:cNvPr id="1" name=""/>
@@ -11135,39 +10286,6 @@
 <file path=ppt/slides/slide34.xml><?xml version="1.0" encoding="utf-8"?>
 <p:sld xmlns:a="http://schemas.openxmlformats.org/drawingml/2006/main" xmlns:r="http://schemas.openxmlformats.org/officeDocument/2006/relationships" xmlns:p="http://schemas.openxmlformats.org/presentationml/2006/main">
   <p:cSld>
-    <p:bg>
-      <p:bgPr>
-        <a:gradFill>
-          <a:gsLst>
-            <a:gs pos="0">
-              <a:schemeClr val="accent1">
-                <a:lumMod val="75000"/>
-              </a:schemeClr>
-            </a:gs>
-            <a:gs pos="100000">
-              <a:schemeClr val="accent1">
-                <a:lumMod val="45000"/>
-                <a:lumOff val="55000"/>
-              </a:schemeClr>
-            </a:gs>
-            <a:gs pos="100000">
-              <a:schemeClr val="accent1">
-                <a:lumMod val="45000"/>
-                <a:lumOff val="55000"/>
-              </a:schemeClr>
-            </a:gs>
-            <a:gs pos="100000">
-              <a:schemeClr val="accent1">
-                <a:lumMod val="30000"/>
-                <a:lumOff val="70000"/>
-              </a:schemeClr>
-            </a:gs>
-          </a:gsLst>
-          <a:lin ang="5400000" scaled="1"/>
-        </a:gradFill>
-        <a:effectLst/>
-      </p:bgPr>
-    </p:bg>
     <p:spTree>
       <p:nvGrpSpPr>
         <p:cNvPr id="1" name=""/>
@@ -11298,39 +10416,6 @@
 <file path=ppt/slides/slide35.xml><?xml version="1.0" encoding="utf-8"?>
 <p:sld xmlns:a="http://schemas.openxmlformats.org/drawingml/2006/main" xmlns:r="http://schemas.openxmlformats.org/officeDocument/2006/relationships" xmlns:p="http://schemas.openxmlformats.org/presentationml/2006/main">
   <p:cSld>
-    <p:bg>
-      <p:bgPr>
-        <a:gradFill>
-          <a:gsLst>
-            <a:gs pos="0">
-              <a:schemeClr val="accent1">
-                <a:lumMod val="75000"/>
-              </a:schemeClr>
-            </a:gs>
-            <a:gs pos="100000">
-              <a:schemeClr val="accent1">
-                <a:lumMod val="45000"/>
-                <a:lumOff val="55000"/>
-              </a:schemeClr>
-            </a:gs>
-            <a:gs pos="100000">
-              <a:schemeClr val="accent1">
-                <a:lumMod val="45000"/>
-                <a:lumOff val="55000"/>
-              </a:schemeClr>
-            </a:gs>
-            <a:gs pos="100000">
-              <a:schemeClr val="accent1">
-                <a:lumMod val="30000"/>
-                <a:lumOff val="70000"/>
-              </a:schemeClr>
-            </a:gs>
-          </a:gsLst>
-          <a:lin ang="5400000" scaled="1"/>
-        </a:gradFill>
-        <a:effectLst/>
-      </p:bgPr>
-    </p:bg>
     <p:spTree>
       <p:nvGrpSpPr>
         <p:cNvPr id="1" name=""/>
@@ -11450,39 +10535,6 @@
 <file path=ppt/slides/slide36.xml><?xml version="1.0" encoding="utf-8"?>
 <p:sld xmlns:a="http://schemas.openxmlformats.org/drawingml/2006/main" xmlns:r="http://schemas.openxmlformats.org/officeDocument/2006/relationships" xmlns:p="http://schemas.openxmlformats.org/presentationml/2006/main">
   <p:cSld>
-    <p:bg>
-      <p:bgPr>
-        <a:gradFill>
-          <a:gsLst>
-            <a:gs pos="0">
-              <a:schemeClr val="accent1">
-                <a:lumMod val="75000"/>
-              </a:schemeClr>
-            </a:gs>
-            <a:gs pos="100000">
-              <a:schemeClr val="accent1">
-                <a:lumMod val="45000"/>
-                <a:lumOff val="55000"/>
-              </a:schemeClr>
-            </a:gs>
-            <a:gs pos="100000">
-              <a:schemeClr val="accent1">
-                <a:lumMod val="45000"/>
-                <a:lumOff val="55000"/>
-              </a:schemeClr>
-            </a:gs>
-            <a:gs pos="100000">
-              <a:schemeClr val="accent1">
-                <a:lumMod val="30000"/>
-                <a:lumOff val="70000"/>
-              </a:schemeClr>
-            </a:gs>
-          </a:gsLst>
-          <a:lin ang="5400000" scaled="1"/>
-        </a:gradFill>
-        <a:effectLst/>
-      </p:bgPr>
-    </p:bg>
     <p:spTree>
       <p:nvGrpSpPr>
         <p:cNvPr id="1" name=""/>
@@ -11604,39 +10656,6 @@
 <file path=ppt/slides/slide37.xml><?xml version="1.0" encoding="utf-8"?>
 <p:sld xmlns:a="http://schemas.openxmlformats.org/drawingml/2006/main" xmlns:r="http://schemas.openxmlformats.org/officeDocument/2006/relationships" xmlns:p="http://schemas.openxmlformats.org/presentationml/2006/main">
   <p:cSld>
-    <p:bg>
-      <p:bgPr>
-        <a:gradFill>
-          <a:gsLst>
-            <a:gs pos="0">
-              <a:schemeClr val="accent1">
-                <a:lumMod val="75000"/>
-              </a:schemeClr>
-            </a:gs>
-            <a:gs pos="100000">
-              <a:schemeClr val="accent1">
-                <a:lumMod val="45000"/>
-                <a:lumOff val="55000"/>
-              </a:schemeClr>
-            </a:gs>
-            <a:gs pos="100000">
-              <a:schemeClr val="accent1">
-                <a:lumMod val="45000"/>
-                <a:lumOff val="55000"/>
-              </a:schemeClr>
-            </a:gs>
-            <a:gs pos="100000">
-              <a:schemeClr val="accent1">
-                <a:lumMod val="30000"/>
-                <a:lumOff val="70000"/>
-              </a:schemeClr>
-            </a:gs>
-          </a:gsLst>
-          <a:lin ang="5400000" scaled="1"/>
-        </a:gradFill>
-        <a:effectLst/>
-      </p:bgPr>
-    </p:bg>
     <p:spTree>
       <p:nvGrpSpPr>
         <p:cNvPr id="1" name=""/>
@@ -11747,42 +10766,240 @@
 </p:sld>
 </file>
 
+<file path=ppt/slides/slide38.xml><?xml version="1.0" encoding="utf-8"?>
+<p:sld xmlns:a="http://schemas.openxmlformats.org/drawingml/2006/main" xmlns:r="http://schemas.openxmlformats.org/officeDocument/2006/relationships" xmlns:p="http://schemas.openxmlformats.org/presentationml/2006/main">
+  <p:cSld>
+    <p:spTree>
+      <p:nvGrpSpPr>
+        <p:cNvPr id="1" name=""/>
+        <p:cNvGrpSpPr/>
+        <p:nvPr/>
+      </p:nvGrpSpPr>
+      <p:grpSpPr>
+        <a:xfrm>
+          <a:off x="0" y="0"/>
+          <a:ext cx="0" cy="0"/>
+          <a:chOff x="0" y="0"/>
+          <a:chExt cx="0" cy="0"/>
+        </a:xfrm>
+      </p:grpSpPr>
+      <p:sp>
+        <p:nvSpPr>
+          <p:cNvPr id="2" name="Title 1">
+            <a:extLst>
+              <a:ext uri="{FF2B5EF4-FFF2-40B4-BE49-F238E27FC236}">
+                <a16:creationId xmlns:a16="http://schemas.microsoft.com/office/drawing/2014/main" id="{CD4D9A14-8E72-45D9-A916-0131C20B819F}"/>
+              </a:ext>
+            </a:extLst>
+          </p:cNvPr>
+          <p:cNvSpPr>
+            <a:spLocks noGrp="1"/>
+          </p:cNvSpPr>
+          <p:nvPr>
+            <p:ph type="ctrTitle"/>
+          </p:nvPr>
+        </p:nvSpPr>
+        <p:spPr/>
+        <p:txBody>
+          <a:bodyPr/>
+          <a:lstStyle/>
+          <a:p>
+            <a:r>
+              <a:rPr lang="en-US" dirty="0"/>
+              <a:t>Events in the DOM</a:t>
+            </a:r>
+            <a:br>
+              <a:rPr lang="en-US" dirty="0"/>
+            </a:br>
+            <a:br>
+              <a:rPr lang="en-US" dirty="0"/>
+            </a:br>
+            <a:endParaRPr lang="en-US" dirty="0"/>
+          </a:p>
+        </p:txBody>
+      </p:sp>
+      <p:sp>
+        <p:nvSpPr>
+          <p:cNvPr id="3" name="Subtitle 2">
+            <a:extLst>
+              <a:ext uri="{FF2B5EF4-FFF2-40B4-BE49-F238E27FC236}">
+                <a16:creationId xmlns:a16="http://schemas.microsoft.com/office/drawing/2014/main" id="{FE17F4CC-50B2-4A48-8CDD-932B70436FA3}"/>
+              </a:ext>
+            </a:extLst>
+          </p:cNvPr>
+          <p:cNvSpPr>
+            <a:spLocks noGrp="1"/>
+          </p:cNvSpPr>
+          <p:nvPr>
+            <p:ph type="subTitle" idx="1"/>
+          </p:nvPr>
+        </p:nvSpPr>
+        <p:spPr/>
+        <p:txBody>
+          <a:bodyPr/>
+          <a:lstStyle/>
+          <a:p>
+            <a:endParaRPr lang="en-US"/>
+          </a:p>
+        </p:txBody>
+      </p:sp>
+    </p:spTree>
+    <p:extLst>
+      <p:ext uri="{BB962C8B-B14F-4D97-AF65-F5344CB8AC3E}">
+        <p14:creationId xmlns:p14="http://schemas.microsoft.com/office/powerpoint/2010/main" val="3778530891"/>
+      </p:ext>
+    </p:extLst>
+  </p:cSld>
+  <p:clrMapOvr>
+    <a:masterClrMapping/>
+  </p:clrMapOvr>
+</p:sld>
+</file>
+
+<file path=ppt/slides/slide39.xml><?xml version="1.0" encoding="utf-8"?>
+<p:sld xmlns:a="http://schemas.openxmlformats.org/drawingml/2006/main" xmlns:r="http://schemas.openxmlformats.org/officeDocument/2006/relationships" xmlns:p="http://schemas.openxmlformats.org/presentationml/2006/main">
+  <p:cSld>
+    <p:spTree>
+      <p:nvGrpSpPr>
+        <p:cNvPr id="1" name=""/>
+        <p:cNvGrpSpPr/>
+        <p:nvPr/>
+      </p:nvGrpSpPr>
+      <p:grpSpPr>
+        <a:xfrm>
+          <a:off x="0" y="0"/>
+          <a:ext cx="0" cy="0"/>
+          <a:chOff x="0" y="0"/>
+          <a:chExt cx="0" cy="0"/>
+        </a:xfrm>
+      </p:grpSpPr>
+      <p:sp>
+        <p:nvSpPr>
+          <p:cNvPr id="2" name="Title 1">
+            <a:extLst>
+              <a:ext uri="{FF2B5EF4-FFF2-40B4-BE49-F238E27FC236}">
+                <a16:creationId xmlns:a16="http://schemas.microsoft.com/office/drawing/2014/main" id="{1D6FB69D-0B45-4517-8D83-648A1164F683}"/>
+              </a:ext>
+            </a:extLst>
+          </p:cNvPr>
+          <p:cNvSpPr>
+            <a:spLocks noGrp="1"/>
+          </p:cNvSpPr>
+          <p:nvPr>
+            <p:ph type="title"/>
+          </p:nvPr>
+        </p:nvSpPr>
+        <p:spPr/>
+        <p:txBody>
+          <a:bodyPr/>
+          <a:lstStyle/>
+          <a:p>
+            <a:r>
+              <a:rPr lang="en-US" dirty="0"/>
+              <a:t>Adding and removing an event listener</a:t>
+            </a:r>
+          </a:p>
+        </p:txBody>
+      </p:sp>
+      <p:sp>
+        <p:nvSpPr>
+          <p:cNvPr id="3" name="Content Placeholder 2">
+            <a:extLst>
+              <a:ext uri="{FF2B5EF4-FFF2-40B4-BE49-F238E27FC236}">
+                <a16:creationId xmlns:a16="http://schemas.microsoft.com/office/drawing/2014/main" id="{E7089CAE-6E52-417F-A3D2-15D2524B172A}"/>
+              </a:ext>
+            </a:extLst>
+          </p:cNvPr>
+          <p:cNvSpPr>
+            <a:spLocks noGrp="1"/>
+          </p:cNvSpPr>
+          <p:nvPr>
+            <p:ph idx="1"/>
+          </p:nvPr>
+        </p:nvSpPr>
+        <p:spPr/>
+        <p:txBody>
+          <a:bodyPr/>
+          <a:lstStyle/>
+          <a:p>
+            <a:r>
+              <a:rPr lang="en-US" dirty="0"/>
+              <a:t>Every DOM element has its own </a:t>
+            </a:r>
+            <a:r>
+              <a:rPr lang="en-US" dirty="0" err="1"/>
+              <a:t>addEventListener</a:t>
+            </a:r>
+            <a:r>
+              <a:rPr lang="en-US" dirty="0"/>
+              <a:t> method, which allows you to listen specifically on that element</a:t>
+            </a:r>
+          </a:p>
+          <a:p>
+            <a:r>
+              <a:rPr lang="en-US" dirty="0"/>
+              <a:t>In the following example, a handler is attached to the button node</a:t>
+            </a:r>
+          </a:p>
+          <a:p>
+            <a:pPr lvl="1"/>
+            <a:r>
+              <a:rPr lang="en-US" dirty="0"/>
+              <a:t>Clicks on the button cause that handler to run, whereas clicks on the rest of the document do not</a:t>
+            </a:r>
+          </a:p>
+          <a:p>
+            <a:pPr lvl="1"/>
+            <a:endParaRPr lang="en-US" dirty="0"/>
+          </a:p>
+        </p:txBody>
+      </p:sp>
+      <p:pic>
+        <p:nvPicPr>
+          <p:cNvPr id="4" name="Picture 3">
+            <a:extLst>
+              <a:ext uri="{FF2B5EF4-FFF2-40B4-BE49-F238E27FC236}">
+                <a16:creationId xmlns:a16="http://schemas.microsoft.com/office/drawing/2014/main" id="{18122E01-D566-474D-9DAF-66172581BFD2}"/>
+              </a:ext>
+            </a:extLst>
+          </p:cNvPr>
+          <p:cNvPicPr>
+            <a:picLocks noChangeAspect="1"/>
+          </p:cNvPicPr>
+          <p:nvPr/>
+        </p:nvPicPr>
+        <p:blipFill>
+          <a:blip r:embed="rId2"/>
+          <a:stretch>
+            <a:fillRect/>
+          </a:stretch>
+        </p:blipFill>
+        <p:spPr>
+          <a:xfrm>
+            <a:off x="2671947" y="4150658"/>
+            <a:ext cx="5353050" cy="1943100"/>
+          </a:xfrm>
+          <a:prstGeom prst="rect">
+            <a:avLst/>
+          </a:prstGeom>
+        </p:spPr>
+      </p:pic>
+    </p:spTree>
+    <p:extLst>
+      <p:ext uri="{BB962C8B-B14F-4D97-AF65-F5344CB8AC3E}">
+        <p14:creationId xmlns:p14="http://schemas.microsoft.com/office/powerpoint/2010/main" val="596634714"/>
+      </p:ext>
+    </p:extLst>
+  </p:cSld>
+  <p:clrMapOvr>
+    <a:masterClrMapping/>
+  </p:clrMapOvr>
+</p:sld>
+</file>
+
 <file path=ppt/slides/slide4.xml><?xml version="1.0" encoding="utf-8"?>
 <p:sld xmlns:a="http://schemas.openxmlformats.org/drawingml/2006/main" xmlns:r="http://schemas.openxmlformats.org/officeDocument/2006/relationships" xmlns:p="http://schemas.openxmlformats.org/presentationml/2006/main">
   <p:cSld>
-    <p:bg>
-      <p:bgPr>
-        <a:gradFill>
-          <a:gsLst>
-            <a:gs pos="0">
-              <a:schemeClr val="accent1">
-                <a:lumMod val="75000"/>
-              </a:schemeClr>
-            </a:gs>
-            <a:gs pos="97000">
-              <a:schemeClr val="accent1">
-                <a:lumMod val="45000"/>
-                <a:lumOff val="55000"/>
-              </a:schemeClr>
-            </a:gs>
-            <a:gs pos="100000">
-              <a:schemeClr val="accent1">
-                <a:lumMod val="45000"/>
-                <a:lumOff val="55000"/>
-              </a:schemeClr>
-            </a:gs>
-            <a:gs pos="100000">
-              <a:schemeClr val="accent1">
-                <a:lumMod val="30000"/>
-                <a:lumOff val="70000"/>
-              </a:schemeClr>
-            </a:gs>
-          </a:gsLst>
-          <a:lin ang="5400000" scaled="1"/>
-        </a:gradFill>
-        <a:effectLst/>
-      </p:bgPr>
-    </p:bg>
     <p:spTree>
       <p:nvGrpSpPr>
         <p:cNvPr id="1" name=""/>
@@ -11938,42 +11155,450 @@
 </p:sld>
 </file>
 
+<file path=ppt/slides/slide40.xml><?xml version="1.0" encoding="utf-8"?>
+<p:sld xmlns:a="http://schemas.openxmlformats.org/drawingml/2006/main" xmlns:r="http://schemas.openxmlformats.org/officeDocument/2006/relationships" xmlns:p="http://schemas.openxmlformats.org/presentationml/2006/main">
+  <p:cSld>
+    <p:spTree>
+      <p:nvGrpSpPr>
+        <p:cNvPr id="1" name=""/>
+        <p:cNvGrpSpPr/>
+        <p:nvPr/>
+      </p:nvGrpSpPr>
+      <p:grpSpPr>
+        <a:xfrm>
+          <a:off x="0" y="0"/>
+          <a:ext cx="0" cy="0"/>
+          <a:chOff x="0" y="0"/>
+          <a:chExt cx="0" cy="0"/>
+        </a:xfrm>
+      </p:grpSpPr>
+      <p:sp>
+        <p:nvSpPr>
+          <p:cNvPr id="2" name="Title 1">
+            <a:extLst>
+              <a:ext uri="{FF2B5EF4-FFF2-40B4-BE49-F238E27FC236}">
+                <a16:creationId xmlns:a16="http://schemas.microsoft.com/office/drawing/2014/main" id="{DD0B538F-5029-4996-B275-783252492547}"/>
+              </a:ext>
+            </a:extLst>
+          </p:cNvPr>
+          <p:cNvSpPr>
+            <a:spLocks noGrp="1"/>
+          </p:cNvSpPr>
+          <p:nvPr>
+            <p:ph type="title"/>
+          </p:nvPr>
+        </p:nvSpPr>
+        <p:spPr/>
+        <p:txBody>
+          <a:bodyPr/>
+          <a:lstStyle/>
+          <a:p>
+            <a:r>
+              <a:rPr lang="en-US" dirty="0"/>
+              <a:t>Adding and removing an event listener (cont’d)</a:t>
+            </a:r>
+          </a:p>
+        </p:txBody>
+      </p:sp>
+      <p:sp>
+        <p:nvSpPr>
+          <p:cNvPr id="3" name="Content Placeholder 2">
+            <a:extLst>
+              <a:ext uri="{FF2B5EF4-FFF2-40B4-BE49-F238E27FC236}">
+                <a16:creationId xmlns:a16="http://schemas.microsoft.com/office/drawing/2014/main" id="{397E43D2-825A-463E-B188-397AADF39E4A}"/>
+              </a:ext>
+            </a:extLst>
+          </p:cNvPr>
+          <p:cNvSpPr>
+            <a:spLocks noGrp="1"/>
+          </p:cNvSpPr>
+          <p:nvPr>
+            <p:ph idx="1"/>
+          </p:nvPr>
+        </p:nvSpPr>
+        <p:spPr/>
+        <p:txBody>
+          <a:bodyPr/>
+          <a:lstStyle/>
+          <a:p>
+            <a:r>
+              <a:rPr lang="en-US" dirty="0"/>
+              <a:t>The </a:t>
+            </a:r>
+            <a:r>
+              <a:rPr lang="en-US" dirty="0" err="1"/>
+              <a:t>removeEventListener</a:t>
+            </a:r>
+            <a:r>
+              <a:rPr lang="en-US" dirty="0"/>
+              <a:t> method, called with arguments similar to as </a:t>
+            </a:r>
+            <a:r>
+              <a:rPr lang="en-US" dirty="0" err="1"/>
+              <a:t>addEventListener</a:t>
+            </a:r>
+            <a:r>
+              <a:rPr lang="en-US" dirty="0"/>
+              <a:t>, removes a handler</a:t>
+            </a:r>
+          </a:p>
+          <a:p>
+            <a:r>
+              <a:rPr lang="en-US" dirty="0"/>
+              <a:t>To be able to unregister a handler function, we give it a name (such as “once”) so that we can pass it to both </a:t>
+            </a:r>
+            <a:r>
+              <a:rPr lang="en-US" dirty="0" err="1"/>
+              <a:t>addEventListener</a:t>
+            </a:r>
+            <a:r>
+              <a:rPr lang="en-US" dirty="0"/>
+              <a:t> and </a:t>
+            </a:r>
+            <a:r>
+              <a:rPr lang="en-US" dirty="0" err="1"/>
+              <a:t>removeEventListener</a:t>
+            </a:r>
+            <a:endParaRPr lang="en-US" dirty="0"/>
+          </a:p>
+          <a:p>
+            <a:endParaRPr lang="en-US" dirty="0"/>
+          </a:p>
+        </p:txBody>
+      </p:sp>
+      <p:pic>
+        <p:nvPicPr>
+          <p:cNvPr id="4" name="Picture 3">
+            <a:extLst>
+              <a:ext uri="{FF2B5EF4-FFF2-40B4-BE49-F238E27FC236}">
+                <a16:creationId xmlns:a16="http://schemas.microsoft.com/office/drawing/2014/main" id="{25AACDCD-31CB-4A4A-AF24-3B22EC0E51E7}"/>
+              </a:ext>
+            </a:extLst>
+          </p:cNvPr>
+          <p:cNvPicPr>
+            <a:picLocks noChangeAspect="1"/>
+          </p:cNvPicPr>
+          <p:nvPr/>
+        </p:nvPicPr>
+        <p:blipFill>
+          <a:blip r:embed="rId2"/>
+          <a:stretch>
+            <a:fillRect/>
+          </a:stretch>
+        </p:blipFill>
+        <p:spPr>
+          <a:xfrm>
+            <a:off x="2919107" y="3907221"/>
+            <a:ext cx="5314950" cy="2133600"/>
+          </a:xfrm>
+          <a:prstGeom prst="rect">
+            <a:avLst/>
+          </a:prstGeom>
+        </p:spPr>
+      </p:pic>
+    </p:spTree>
+    <p:extLst>
+      <p:ext uri="{BB962C8B-B14F-4D97-AF65-F5344CB8AC3E}">
+        <p14:creationId xmlns:p14="http://schemas.microsoft.com/office/powerpoint/2010/main" val="3544084577"/>
+      </p:ext>
+    </p:extLst>
+  </p:cSld>
+  <p:clrMapOvr>
+    <a:masterClrMapping/>
+  </p:clrMapOvr>
+</p:sld>
+</file>
+
+<file path=ppt/slides/slide41.xml><?xml version="1.0" encoding="utf-8"?>
+<p:sld xmlns:a="http://schemas.openxmlformats.org/drawingml/2006/main" xmlns:r="http://schemas.openxmlformats.org/officeDocument/2006/relationships" xmlns:p="http://schemas.openxmlformats.org/presentationml/2006/main">
+  <p:cSld>
+    <p:spTree>
+      <p:nvGrpSpPr>
+        <p:cNvPr id="1" name=""/>
+        <p:cNvGrpSpPr/>
+        <p:nvPr/>
+      </p:nvGrpSpPr>
+      <p:grpSpPr>
+        <a:xfrm>
+          <a:off x="0" y="0"/>
+          <a:ext cx="0" cy="0"/>
+          <a:chOff x="0" y="0"/>
+          <a:chExt cx="0" cy="0"/>
+        </a:xfrm>
+      </p:grpSpPr>
+      <p:sp>
+        <p:nvSpPr>
+          <p:cNvPr id="2" name="Title 1">
+            <a:extLst>
+              <a:ext uri="{FF2B5EF4-FFF2-40B4-BE49-F238E27FC236}">
+                <a16:creationId xmlns:a16="http://schemas.microsoft.com/office/drawing/2014/main" id="{2C850310-4126-416A-AF06-E588C3B3C8F0}"/>
+              </a:ext>
+            </a:extLst>
+          </p:cNvPr>
+          <p:cNvSpPr>
+            <a:spLocks noGrp="1"/>
+          </p:cNvSpPr>
+          <p:nvPr>
+            <p:ph type="title"/>
+          </p:nvPr>
+        </p:nvSpPr>
+        <p:spPr/>
+        <p:txBody>
+          <a:bodyPr/>
+          <a:lstStyle/>
+          <a:p>
+            <a:r>
+              <a:rPr lang="en-US" dirty="0"/>
+              <a:t>Event objects</a:t>
+            </a:r>
+          </a:p>
+        </p:txBody>
+      </p:sp>
+      <p:sp>
+        <p:nvSpPr>
+          <p:cNvPr id="3" name="Content Placeholder 2">
+            <a:extLst>
+              <a:ext uri="{FF2B5EF4-FFF2-40B4-BE49-F238E27FC236}">
+                <a16:creationId xmlns:a16="http://schemas.microsoft.com/office/drawing/2014/main" id="{5E959471-1937-48ED-9BE1-73EA073E6279}"/>
+              </a:ext>
+            </a:extLst>
+          </p:cNvPr>
+          <p:cNvSpPr>
+            <a:spLocks noGrp="1"/>
+          </p:cNvSpPr>
+          <p:nvPr>
+            <p:ph idx="1"/>
+          </p:nvPr>
+        </p:nvSpPr>
+        <p:spPr/>
+        <p:txBody>
+          <a:bodyPr/>
+          <a:lstStyle/>
+          <a:p>
+            <a:r>
+              <a:rPr lang="en-US" dirty="0"/>
+              <a:t>Event handler functions are passed an argument, called the event object, which gives us additional information about the event</a:t>
+            </a:r>
+          </a:p>
+          <a:p>
+            <a:pPr lvl="1"/>
+            <a:r>
+              <a:rPr lang="en-US" dirty="0"/>
+              <a:t>For example, if we want to know which mouse button was pressed, we can look at an event object’s which property</a:t>
+            </a:r>
+          </a:p>
+          <a:p>
+            <a:pPr lvl="1"/>
+            <a:r>
+              <a:rPr lang="en-US" dirty="0"/>
+              <a:t>The object’s type property always holds a string identifying the event (for example “click” or “</a:t>
+            </a:r>
+            <a:r>
+              <a:rPr lang="en-US" dirty="0" err="1"/>
+              <a:t>mousedown</a:t>
+            </a:r>
+            <a:r>
+              <a:rPr lang="en-US" dirty="0"/>
+              <a:t>”)</a:t>
+            </a:r>
+          </a:p>
+          <a:p>
+            <a:r>
+              <a:rPr lang="en-US" dirty="0"/>
+              <a:t>The information stored in an event object differs per type of event</a:t>
+            </a:r>
+          </a:p>
+        </p:txBody>
+      </p:sp>
+    </p:spTree>
+    <p:extLst>
+      <p:ext uri="{BB962C8B-B14F-4D97-AF65-F5344CB8AC3E}">
+        <p14:creationId xmlns:p14="http://schemas.microsoft.com/office/powerpoint/2010/main" val="1472300602"/>
+      </p:ext>
+    </p:extLst>
+  </p:cSld>
+  <p:clrMapOvr>
+    <a:masterClrMapping/>
+  </p:clrMapOvr>
+</p:sld>
+</file>
+
+<file path=ppt/slides/slide42.xml><?xml version="1.0" encoding="utf-8"?>
+<p:sld xmlns:a="http://schemas.openxmlformats.org/drawingml/2006/main" xmlns:r="http://schemas.openxmlformats.org/officeDocument/2006/relationships" xmlns:p="http://schemas.openxmlformats.org/presentationml/2006/main">
+  <p:cSld>
+    <p:spTree>
+      <p:nvGrpSpPr>
+        <p:cNvPr id="1" name=""/>
+        <p:cNvGrpSpPr/>
+        <p:nvPr/>
+      </p:nvGrpSpPr>
+      <p:grpSpPr>
+        <a:xfrm>
+          <a:off x="0" y="0"/>
+          <a:ext cx="0" cy="0"/>
+          <a:chOff x="0" y="0"/>
+          <a:chExt cx="0" cy="0"/>
+        </a:xfrm>
+      </p:grpSpPr>
+      <p:sp>
+        <p:nvSpPr>
+          <p:cNvPr id="2" name="Title 1">
+            <a:extLst>
+              <a:ext uri="{FF2B5EF4-FFF2-40B4-BE49-F238E27FC236}">
+                <a16:creationId xmlns:a16="http://schemas.microsoft.com/office/drawing/2014/main" id="{D472F580-17C4-4EBA-93B5-72862B711F70}"/>
+              </a:ext>
+            </a:extLst>
+          </p:cNvPr>
+          <p:cNvSpPr>
+            <a:spLocks noGrp="1"/>
+          </p:cNvSpPr>
+          <p:nvPr>
+            <p:ph type="title"/>
+          </p:nvPr>
+        </p:nvSpPr>
+        <p:spPr/>
+        <p:txBody>
+          <a:bodyPr/>
+          <a:lstStyle/>
+          <a:p>
+            <a:r>
+              <a:rPr lang="en-US" dirty="0"/>
+              <a:t>Event object (cont’d)</a:t>
+            </a:r>
+          </a:p>
+        </p:txBody>
+      </p:sp>
+      <p:pic>
+        <p:nvPicPr>
+          <p:cNvPr id="4" name="Content Placeholder 3">
+            <a:extLst>
+              <a:ext uri="{FF2B5EF4-FFF2-40B4-BE49-F238E27FC236}">
+                <a16:creationId xmlns:a16="http://schemas.microsoft.com/office/drawing/2014/main" id="{D057D660-31C9-4D24-BEBB-481C49FA8C14}"/>
+              </a:ext>
+            </a:extLst>
+          </p:cNvPr>
+          <p:cNvPicPr>
+            <a:picLocks noGrp="1" noChangeAspect="1"/>
+          </p:cNvPicPr>
+          <p:nvPr>
+            <p:ph idx="1"/>
+          </p:nvPr>
+        </p:nvPicPr>
+        <p:blipFill>
+          <a:blip r:embed="rId2"/>
+          <a:stretch>
+            <a:fillRect/>
+          </a:stretch>
+        </p:blipFill>
+        <p:spPr>
+          <a:xfrm>
+            <a:off x="3109912" y="2204403"/>
+            <a:ext cx="5972175" cy="2800350"/>
+          </a:xfrm>
+          <a:prstGeom prst="rect">
+            <a:avLst/>
+          </a:prstGeom>
+        </p:spPr>
+      </p:pic>
+    </p:spTree>
+    <p:extLst>
+      <p:ext uri="{BB962C8B-B14F-4D97-AF65-F5344CB8AC3E}">
+        <p14:creationId xmlns:p14="http://schemas.microsoft.com/office/powerpoint/2010/main" val="3736110650"/>
+      </p:ext>
+    </p:extLst>
+  </p:cSld>
+  <p:clrMapOvr>
+    <a:masterClrMapping/>
+  </p:clrMapOvr>
+</p:sld>
+</file>
+
+<file path=ppt/slides/slide43.xml><?xml version="1.0" encoding="utf-8"?>
+<p:sld xmlns:a="http://schemas.openxmlformats.org/drawingml/2006/main" xmlns:r="http://schemas.openxmlformats.org/officeDocument/2006/relationships" xmlns:p="http://schemas.openxmlformats.org/presentationml/2006/main">
+  <p:cSld>
+    <p:spTree>
+      <p:nvGrpSpPr>
+        <p:cNvPr id="1" name=""/>
+        <p:cNvGrpSpPr/>
+        <p:nvPr/>
+      </p:nvGrpSpPr>
+      <p:grpSpPr>
+        <a:xfrm>
+          <a:off x="0" y="0"/>
+          <a:ext cx="0" cy="0"/>
+          <a:chOff x="0" y="0"/>
+          <a:chExt cx="0" cy="0"/>
+        </a:xfrm>
+      </p:grpSpPr>
+      <p:sp>
+        <p:nvSpPr>
+          <p:cNvPr id="2" name="Title 1">
+            <a:extLst>
+              <a:ext uri="{FF2B5EF4-FFF2-40B4-BE49-F238E27FC236}">
+                <a16:creationId xmlns:a16="http://schemas.microsoft.com/office/drawing/2014/main" id="{DFB17008-A9A8-4944-9748-0B0362A2F781}"/>
+              </a:ext>
+            </a:extLst>
+          </p:cNvPr>
+          <p:cNvSpPr>
+            <a:spLocks noGrp="1"/>
+          </p:cNvSpPr>
+          <p:nvPr>
+            <p:ph type="title"/>
+          </p:nvPr>
+        </p:nvSpPr>
+        <p:spPr/>
+        <p:txBody>
+          <a:bodyPr/>
+          <a:lstStyle/>
+          <a:p>
+            <a:r>
+              <a:rPr lang="en-US" dirty="0"/>
+              <a:t>Key events</a:t>
+            </a:r>
+          </a:p>
+        </p:txBody>
+      </p:sp>
+      <p:sp>
+        <p:nvSpPr>
+          <p:cNvPr id="3" name="Content Placeholder 2">
+            <a:extLst>
+              <a:ext uri="{FF2B5EF4-FFF2-40B4-BE49-F238E27FC236}">
+                <a16:creationId xmlns:a16="http://schemas.microsoft.com/office/drawing/2014/main" id="{54F7D103-FBE7-4DCC-8B30-0F12128967F6}"/>
+              </a:ext>
+            </a:extLst>
+          </p:cNvPr>
+          <p:cNvSpPr>
+            <a:spLocks noGrp="1"/>
+          </p:cNvSpPr>
+          <p:nvPr>
+            <p:ph idx="1"/>
+          </p:nvPr>
+        </p:nvSpPr>
+        <p:spPr/>
+        <p:txBody>
+          <a:bodyPr/>
+          <a:lstStyle/>
+          <a:p>
+            <a:endParaRPr lang="en-US"/>
+          </a:p>
+        </p:txBody>
+      </p:sp>
+    </p:spTree>
+    <p:extLst>
+      <p:ext uri="{BB962C8B-B14F-4D97-AF65-F5344CB8AC3E}">
+        <p14:creationId xmlns:p14="http://schemas.microsoft.com/office/powerpoint/2010/main" val="3516681535"/>
+      </p:ext>
+    </p:extLst>
+  </p:cSld>
+  <p:clrMapOvr>
+    <a:masterClrMapping/>
+  </p:clrMapOvr>
+</p:sld>
+</file>
+
 <file path=ppt/slides/slide5.xml><?xml version="1.0" encoding="utf-8"?>
 <p:sld xmlns:a="http://schemas.openxmlformats.org/drawingml/2006/main" xmlns:r="http://schemas.openxmlformats.org/officeDocument/2006/relationships" xmlns:p="http://schemas.openxmlformats.org/presentationml/2006/main">
   <p:cSld>
-    <p:bg>
-      <p:bgPr>
-        <a:gradFill>
-          <a:gsLst>
-            <a:gs pos="0">
-              <a:schemeClr val="accent1">
-                <a:lumMod val="75000"/>
-              </a:schemeClr>
-            </a:gs>
-            <a:gs pos="97000">
-              <a:schemeClr val="accent1">
-                <a:lumMod val="45000"/>
-                <a:lumOff val="55000"/>
-              </a:schemeClr>
-            </a:gs>
-            <a:gs pos="100000">
-              <a:schemeClr val="accent1">
-                <a:lumMod val="45000"/>
-                <a:lumOff val="55000"/>
-              </a:schemeClr>
-            </a:gs>
-            <a:gs pos="100000">
-              <a:schemeClr val="accent1">
-                <a:lumMod val="30000"/>
-                <a:lumOff val="70000"/>
-              </a:schemeClr>
-            </a:gs>
-          </a:gsLst>
-          <a:lin ang="5400000" scaled="1"/>
-        </a:gradFill>
-        <a:effectLst/>
-      </p:bgPr>
-    </p:bg>
     <p:spTree>
       <p:nvGrpSpPr>
         <p:cNvPr id="1" name=""/>
@@ -12171,39 +11796,6 @@
 <file path=ppt/slides/slide6.xml><?xml version="1.0" encoding="utf-8"?>
 <p:sld xmlns:a="http://schemas.openxmlformats.org/drawingml/2006/main" xmlns:r="http://schemas.openxmlformats.org/officeDocument/2006/relationships" xmlns:p="http://schemas.openxmlformats.org/presentationml/2006/main">
   <p:cSld>
-    <p:bg>
-      <p:bgPr>
-        <a:gradFill>
-          <a:gsLst>
-            <a:gs pos="0">
-              <a:schemeClr val="accent1">
-                <a:lumMod val="75000"/>
-              </a:schemeClr>
-            </a:gs>
-            <a:gs pos="97000">
-              <a:schemeClr val="accent1">
-                <a:lumMod val="45000"/>
-                <a:lumOff val="55000"/>
-              </a:schemeClr>
-            </a:gs>
-            <a:gs pos="100000">
-              <a:schemeClr val="accent1">
-                <a:lumMod val="45000"/>
-                <a:lumOff val="55000"/>
-              </a:schemeClr>
-            </a:gs>
-            <a:gs pos="100000">
-              <a:schemeClr val="accent1">
-                <a:lumMod val="30000"/>
-                <a:lumOff val="70000"/>
-              </a:schemeClr>
-            </a:gs>
-          </a:gsLst>
-          <a:lin ang="5400000" scaled="1"/>
-        </a:gradFill>
-        <a:effectLst/>
-      </p:bgPr>
-    </p:bg>
     <p:spTree>
       <p:nvGrpSpPr>
         <p:cNvPr id="1" name=""/>
@@ -12353,39 +11945,6 @@
 <file path=ppt/slides/slide7.xml><?xml version="1.0" encoding="utf-8"?>
 <p:sld xmlns:a="http://schemas.openxmlformats.org/drawingml/2006/main" xmlns:r="http://schemas.openxmlformats.org/officeDocument/2006/relationships" xmlns:p="http://schemas.openxmlformats.org/presentationml/2006/main">
   <p:cSld>
-    <p:bg>
-      <p:bgPr>
-        <a:gradFill>
-          <a:gsLst>
-            <a:gs pos="0">
-              <a:schemeClr val="accent1">
-                <a:lumMod val="75000"/>
-              </a:schemeClr>
-            </a:gs>
-            <a:gs pos="97000">
-              <a:schemeClr val="accent1">
-                <a:lumMod val="45000"/>
-                <a:lumOff val="55000"/>
-              </a:schemeClr>
-            </a:gs>
-            <a:gs pos="100000">
-              <a:schemeClr val="accent1">
-                <a:lumMod val="45000"/>
-                <a:lumOff val="55000"/>
-              </a:schemeClr>
-            </a:gs>
-            <a:gs pos="100000">
-              <a:schemeClr val="accent1">
-                <a:lumMod val="30000"/>
-                <a:lumOff val="70000"/>
-              </a:schemeClr>
-            </a:gs>
-          </a:gsLst>
-          <a:lin ang="5400000" scaled="1"/>
-        </a:gradFill>
-        <a:effectLst/>
-      </p:bgPr>
-    </p:bg>
     <p:spTree>
       <p:nvGrpSpPr>
         <p:cNvPr id="1" name=""/>
@@ -12541,39 +12100,6 @@
 <file path=ppt/slides/slide8.xml><?xml version="1.0" encoding="utf-8"?>
 <p:sld xmlns:a="http://schemas.openxmlformats.org/drawingml/2006/main" xmlns:r="http://schemas.openxmlformats.org/officeDocument/2006/relationships" xmlns:p="http://schemas.openxmlformats.org/presentationml/2006/main">
   <p:cSld>
-    <p:bg>
-      <p:bgPr>
-        <a:gradFill>
-          <a:gsLst>
-            <a:gs pos="0">
-              <a:schemeClr val="accent1">
-                <a:lumMod val="75000"/>
-              </a:schemeClr>
-            </a:gs>
-            <a:gs pos="97000">
-              <a:schemeClr val="accent1">
-                <a:lumMod val="45000"/>
-                <a:lumOff val="55000"/>
-              </a:schemeClr>
-            </a:gs>
-            <a:gs pos="100000">
-              <a:schemeClr val="accent1">
-                <a:lumMod val="45000"/>
-                <a:lumOff val="55000"/>
-              </a:schemeClr>
-            </a:gs>
-            <a:gs pos="100000">
-              <a:schemeClr val="accent1">
-                <a:lumMod val="30000"/>
-                <a:lumOff val="70000"/>
-              </a:schemeClr>
-            </a:gs>
-          </a:gsLst>
-          <a:lin ang="5400000" scaled="1"/>
-        </a:gradFill>
-        <a:effectLst/>
-      </p:bgPr>
-    </p:bg>
     <p:spTree>
       <p:nvGrpSpPr>
         <p:cNvPr id="1" name=""/>
@@ -12745,39 +12271,6 @@
 <file path=ppt/slides/slide9.xml><?xml version="1.0" encoding="utf-8"?>
 <p:sld xmlns:a="http://schemas.openxmlformats.org/drawingml/2006/main" xmlns:r="http://schemas.openxmlformats.org/officeDocument/2006/relationships" xmlns:p="http://schemas.openxmlformats.org/presentationml/2006/main">
   <p:cSld>
-    <p:bg>
-      <p:bgPr>
-        <a:gradFill>
-          <a:gsLst>
-            <a:gs pos="0">
-              <a:schemeClr val="accent1">
-                <a:lumMod val="75000"/>
-              </a:schemeClr>
-            </a:gs>
-            <a:gs pos="97000">
-              <a:schemeClr val="accent1">
-                <a:lumMod val="45000"/>
-                <a:lumOff val="55000"/>
-              </a:schemeClr>
-            </a:gs>
-            <a:gs pos="100000">
-              <a:schemeClr val="accent1">
-                <a:lumMod val="45000"/>
-                <a:lumOff val="55000"/>
-              </a:schemeClr>
-            </a:gs>
-            <a:gs pos="100000">
-              <a:schemeClr val="accent1">
-                <a:lumMod val="30000"/>
-                <a:lumOff val="70000"/>
-              </a:schemeClr>
-            </a:gs>
-          </a:gsLst>
-          <a:lin ang="5400000" scaled="1"/>
-        </a:gradFill>
-        <a:effectLst/>
-      </p:bgPr>
-    </p:bg>
     <p:spTree>
       <p:nvGrpSpPr>
         <p:cNvPr id="1" name=""/>

</xml_diff>